<commit_message>
Präsentation und Ablaufplan aktualisiert
</commit_message>
<xml_diff>
--- a/Dokumente/Projektpräsentation_Cnema.pptx
+++ b/Dokumente/Projektpräsentation_Cnema.pptx
@@ -5,10 +5,10 @@
     <p:sldMasterId id="2147483648" r:id="rId1"/>
   </p:sldMasterIdLst>
   <p:notesMasterIdLst>
-    <p:notesMasterId r:id="rId12"/>
+    <p:notesMasterId r:id="rId11"/>
   </p:notesMasterIdLst>
   <p:handoutMasterIdLst>
-    <p:handoutMasterId r:id="rId13"/>
+    <p:handoutMasterId r:id="rId12"/>
   </p:handoutMasterIdLst>
   <p:sldIdLst>
     <p:sldId id="256" r:id="rId2"/>
@@ -16,11 +16,10 @@
     <p:sldId id="258" r:id="rId4"/>
     <p:sldId id="259" r:id="rId5"/>
     <p:sldId id="260" r:id="rId6"/>
-    <p:sldId id="262" r:id="rId7"/>
-    <p:sldId id="264" r:id="rId8"/>
-    <p:sldId id="265" r:id="rId9"/>
-    <p:sldId id="261" r:id="rId10"/>
-    <p:sldId id="263" r:id="rId11"/>
+    <p:sldId id="264" r:id="rId7"/>
+    <p:sldId id="265" r:id="rId8"/>
+    <p:sldId id="261" r:id="rId9"/>
+    <p:sldId id="263" r:id="rId10"/>
   </p:sldIdLst>
   <p:sldSz cx="12192000" cy="6858000"/>
   <p:notesSz cx="6858000" cy="9144000"/>
@@ -228,7 +227,7 @@
           <a:p>
             <a:fld id="{EBA475C9-CC36-4E7E-8CB4-2214DCFFA1FA}" type="datetimeFigureOut">
               <a:rPr lang="de-DE" smtClean="0"/>
-              <a:t>16.01.2018</a:t>
+              <a:t>18.01.2018</a:t>
             </a:fld>
             <a:endParaRPr lang="de-DE"/>
           </a:p>
@@ -405,7 +404,7 @@
           <a:p>
             <a:fld id="{846540AB-AE9D-4C3E-AEF1-110218B86D1E}" type="datetimeFigureOut">
               <a:rPr lang="de-DE" smtClean="0"/>
-              <a:t>16.01.2018</a:t>
+              <a:t>18.01.2018</a:t>
             </a:fld>
             <a:endParaRPr lang="de-DE"/>
           </a:p>
@@ -943,7 +942,7 @@
           <a:p>
             <a:fld id="{54E5E412-067E-4261-A42C-780D4636A693}" type="datetimeFigureOut">
               <a:rPr lang="de-DE" smtClean="0"/>
-              <a:t>16.01.2018</a:t>
+              <a:t>18.01.2018</a:t>
             </a:fld>
             <a:endParaRPr lang="de-DE"/>
           </a:p>
@@ -1151,7 +1150,7 @@
           <a:p>
             <a:fld id="{54E5E412-067E-4261-A42C-780D4636A693}" type="datetimeFigureOut">
               <a:rPr lang="de-DE" smtClean="0"/>
-              <a:t>16.01.2018</a:t>
+              <a:t>18.01.2018</a:t>
             </a:fld>
             <a:endParaRPr lang="de-DE"/>
           </a:p>
@@ -1676,7 +1675,7 @@
           <a:p>
             <a:fld id="{54E5E412-067E-4261-A42C-780D4636A693}" type="datetimeFigureOut">
               <a:rPr lang="de-DE" smtClean="0"/>
-              <a:t>16.01.2018</a:t>
+              <a:t>18.01.2018</a:t>
             </a:fld>
             <a:endParaRPr lang="de-DE"/>
           </a:p>
@@ -1941,7 +1940,7 @@
           <a:p>
             <a:fld id="{54E5E412-067E-4261-A42C-780D4636A693}" type="datetimeFigureOut">
               <a:rPr lang="de-DE" smtClean="0"/>
-              <a:t>16.01.2018</a:t>
+              <a:t>18.01.2018</a:t>
             </a:fld>
             <a:endParaRPr lang="de-DE"/>
           </a:p>
@@ -2353,7 +2352,7 @@
           <a:p>
             <a:fld id="{54E5E412-067E-4261-A42C-780D4636A693}" type="datetimeFigureOut">
               <a:rPr lang="de-DE" smtClean="0"/>
-              <a:t>16.01.2018</a:t>
+              <a:t>18.01.2018</a:t>
             </a:fld>
             <a:endParaRPr lang="de-DE"/>
           </a:p>
@@ -2494,7 +2493,7 @@
           <a:p>
             <a:fld id="{54E5E412-067E-4261-A42C-780D4636A693}" type="datetimeFigureOut">
               <a:rPr lang="de-DE" smtClean="0"/>
-              <a:t>16.01.2018</a:t>
+              <a:t>18.01.2018</a:t>
             </a:fld>
             <a:endParaRPr lang="de-DE"/>
           </a:p>
@@ -2607,7 +2606,7 @@
           <a:p>
             <a:fld id="{54E5E412-067E-4261-A42C-780D4636A693}" type="datetimeFigureOut">
               <a:rPr lang="de-DE" smtClean="0"/>
-              <a:t>16.01.2018</a:t>
+              <a:t>18.01.2018</a:t>
             </a:fld>
             <a:endParaRPr lang="de-DE"/>
           </a:p>
@@ -2918,7 +2917,7 @@
           <a:p>
             <a:fld id="{54E5E412-067E-4261-A42C-780D4636A693}" type="datetimeFigureOut">
               <a:rPr lang="de-DE" smtClean="0"/>
-              <a:t>16.01.2018</a:t>
+              <a:t>18.01.2018</a:t>
             </a:fld>
             <a:endParaRPr lang="de-DE"/>
           </a:p>
@@ -3206,7 +3205,7 @@
           <a:p>
             <a:fld id="{54E5E412-067E-4261-A42C-780D4636A693}" type="datetimeFigureOut">
               <a:rPr lang="de-DE" smtClean="0"/>
-              <a:t>16.01.2018</a:t>
+              <a:t>18.01.2018</a:t>
             </a:fld>
             <a:endParaRPr lang="de-DE"/>
           </a:p>
@@ -3447,7 +3446,7 @@
           <a:p>
             <a:fld id="{54E5E412-067E-4261-A42C-780D4636A693}" type="datetimeFigureOut">
               <a:rPr lang="de-DE" smtClean="0"/>
-              <a:t>16.01.2018</a:t>
+              <a:t>18.01.2018</a:t>
             </a:fld>
             <a:endParaRPr lang="de-DE"/>
           </a:p>
@@ -4254,441 +4253,6 @@
 </p:sld>
 </file>
 
-<file path=ppt/slides/slide10.xml><?xml version="1.0" encoding="utf-8"?>
-<p:sld xmlns:a="http://schemas.openxmlformats.org/drawingml/2006/main" xmlns:r="http://schemas.openxmlformats.org/officeDocument/2006/relationships" xmlns:p="http://schemas.openxmlformats.org/presentationml/2006/main">
-  <p:cSld>
-    <p:spTree>
-      <p:nvGrpSpPr>
-        <p:cNvPr id="1" name=""/>
-        <p:cNvGrpSpPr/>
-        <p:nvPr/>
-      </p:nvGrpSpPr>
-      <p:grpSpPr>
-        <a:xfrm>
-          <a:off x="0" y="0"/>
-          <a:ext cx="0" cy="0"/>
-          <a:chOff x="0" y="0"/>
-          <a:chExt cx="0" cy="0"/>
-        </a:xfrm>
-      </p:grpSpPr>
-      <p:sp>
-        <p:nvSpPr>
-          <p:cNvPr id="3" name="Inhaltsplatzhalter 2">
-            <a:extLst>
-              <a:ext uri="{FF2B5EF4-FFF2-40B4-BE49-F238E27FC236}">
-                <a16:creationId xmlns:a16="http://schemas.microsoft.com/office/drawing/2014/main" id="{624FDB27-9E2B-444F-8181-C8B9F1B49BAA}"/>
-              </a:ext>
-            </a:extLst>
-          </p:cNvPr>
-          <p:cNvSpPr>
-            <a:spLocks noGrp="1"/>
-          </p:cNvSpPr>
-          <p:nvPr>
-            <p:ph idx="1"/>
-          </p:nvPr>
-        </p:nvSpPr>
-        <p:spPr>
-          <a:xfrm>
-            <a:off x="838200" y="1355842"/>
-            <a:ext cx="10515600" cy="1815198"/>
-          </a:xfrm>
-        </p:spPr>
-        <p:txBody>
-          <a:bodyPr>
-            <a:normAutofit/>
-          </a:bodyPr>
-          <a:lstStyle/>
-          <a:p>
-            <a:pPr marL="0" indent="0" algn="ctr">
-              <a:buNone/>
-            </a:pPr>
-            <a:r>
-              <a:rPr lang="de-DE" sz="6000" b="1" dirty="0">
-                <a:solidFill>
-                  <a:schemeClr val="bg1"/>
-                </a:solidFill>
-              </a:rPr>
-              <a:t>Vielen Dank für Ihre Aufmerksamkeit!</a:t>
-            </a:r>
-          </a:p>
-        </p:txBody>
-      </p:sp>
-      <p:sp>
-        <p:nvSpPr>
-          <p:cNvPr id="4" name="Datumsplatzhalter 3">
-            <a:extLst>
-              <a:ext uri="{FF2B5EF4-FFF2-40B4-BE49-F238E27FC236}">
-                <a16:creationId xmlns:a16="http://schemas.microsoft.com/office/drawing/2014/main" id="{A7A59E71-CF6A-4AC8-B590-D26831A03599}"/>
-              </a:ext>
-            </a:extLst>
-          </p:cNvPr>
-          <p:cNvSpPr>
-            <a:spLocks noGrp="1"/>
-          </p:cNvSpPr>
-          <p:nvPr>
-            <p:ph type="dt" sz="half" idx="10"/>
-          </p:nvPr>
-        </p:nvSpPr>
-        <p:spPr/>
-        <p:txBody>
-          <a:bodyPr/>
-          <a:lstStyle/>
-          <a:p>
-            <a:r>
-              <a:rPr lang="de-DE"/>
-              <a:t>Hamberger, Herzog, Güloglu</a:t>
-            </a:r>
-            <a:endParaRPr lang="de-DE" dirty="0"/>
-          </a:p>
-        </p:txBody>
-      </p:sp>
-      <p:sp>
-        <p:nvSpPr>
-          <p:cNvPr id="5" name="Fußzeilenplatzhalter 4">
-            <a:extLst>
-              <a:ext uri="{FF2B5EF4-FFF2-40B4-BE49-F238E27FC236}">
-                <a16:creationId xmlns:a16="http://schemas.microsoft.com/office/drawing/2014/main" id="{58CB982E-5159-47F1-90B2-A070A4E8CFF8}"/>
-              </a:ext>
-            </a:extLst>
-          </p:cNvPr>
-          <p:cNvSpPr>
-            <a:spLocks noGrp="1"/>
-          </p:cNvSpPr>
-          <p:nvPr>
-            <p:ph type="ftr" sz="quarter" idx="11"/>
-          </p:nvPr>
-        </p:nvSpPr>
-        <p:spPr/>
-        <p:txBody>
-          <a:bodyPr/>
-          <a:lstStyle/>
-          <a:p>
-            <a:r>
-              <a:rPr lang="de-DE"/>
-              <a:t>Projekt C#nema</a:t>
-            </a:r>
-            <a:endParaRPr lang="de-DE" dirty="0"/>
-          </a:p>
-        </p:txBody>
-      </p:sp>
-      <p:sp>
-        <p:nvSpPr>
-          <p:cNvPr id="6" name="Foliennummernplatzhalter 5">
-            <a:extLst>
-              <a:ext uri="{FF2B5EF4-FFF2-40B4-BE49-F238E27FC236}">
-                <a16:creationId xmlns:a16="http://schemas.microsoft.com/office/drawing/2014/main" id="{A84F22F8-791C-401F-865F-FA5923FE32A5}"/>
-              </a:ext>
-            </a:extLst>
-          </p:cNvPr>
-          <p:cNvSpPr>
-            <a:spLocks noGrp="1"/>
-          </p:cNvSpPr>
-          <p:nvPr>
-            <p:ph type="sldNum" sz="quarter" idx="12"/>
-          </p:nvPr>
-        </p:nvSpPr>
-        <p:spPr/>
-        <p:txBody>
-          <a:bodyPr/>
-          <a:lstStyle/>
-          <a:p>
-            <a:fld id="{BFB0D74E-8F52-4ACD-AC95-88CD3CFD8314}" type="slidenum">
-              <a:rPr lang="de-DE" smtClean="0"/>
-              <a:pPr/>
-              <a:t>10</a:t>
-            </a:fld>
-            <a:endParaRPr lang="de-DE" dirty="0"/>
-          </a:p>
-        </p:txBody>
-      </p:sp>
-      <p:pic>
-        <p:nvPicPr>
-          <p:cNvPr id="7" name="Grafik 6">
-            <a:extLst>
-              <a:ext uri="{FF2B5EF4-FFF2-40B4-BE49-F238E27FC236}">
-                <a16:creationId xmlns:a16="http://schemas.microsoft.com/office/drawing/2014/main" id="{118131DD-61D1-49FC-A587-BEFCF48E833B}"/>
-              </a:ext>
-            </a:extLst>
-          </p:cNvPr>
-          <p:cNvPicPr>
-            <a:picLocks noChangeAspect="1"/>
-          </p:cNvPicPr>
-          <p:nvPr/>
-        </p:nvPicPr>
-        <p:blipFill>
-          <a:blip r:embed="rId2">
-            <a:extLst>
-              <a:ext uri="{28A0092B-C50C-407E-A947-70E740481C1C}">
-                <a14:useLocalDpi xmlns:a14="http://schemas.microsoft.com/office/drawing/2010/main" val="0"/>
-              </a:ext>
-            </a:extLst>
-          </a:blip>
-          <a:stretch>
-            <a:fillRect/>
-          </a:stretch>
-        </p:blipFill>
-        <p:spPr>
-          <a:xfrm>
-            <a:off x="5085282" y="3568760"/>
-            <a:ext cx="2021435" cy="1516076"/>
-          </a:xfrm>
-          <a:prstGeom prst="rect">
-            <a:avLst/>
-          </a:prstGeom>
-          <a:ln>
-            <a:noFill/>
-          </a:ln>
-          <a:effectLst>
-            <a:outerShdw blurRad="292100" dist="139700" dir="2700000" algn="tl" rotWithShape="0">
-              <a:srgbClr val="333333">
-                <a:alpha val="65000"/>
-              </a:srgbClr>
-            </a:outerShdw>
-          </a:effectLst>
-        </p:spPr>
-      </p:pic>
-    </p:spTree>
-    <p:extLst>
-      <p:ext uri="{BB962C8B-B14F-4D97-AF65-F5344CB8AC3E}">
-        <p14:creationId xmlns:p14="http://schemas.microsoft.com/office/powerpoint/2010/main" val="3075807771"/>
-      </p:ext>
-    </p:extLst>
-  </p:cSld>
-  <p:clrMapOvr>
-    <a:masterClrMapping/>
-  </p:clrMapOvr>
-  <p:timing>
-    <p:tnLst>
-      <p:par>
-        <p:cTn id="1" dur="indefinite" restart="never" nodeType="tmRoot">
-          <p:childTnLst>
-            <p:seq concurrent="1" nextAc="seek">
-              <p:cTn id="2" dur="indefinite" nodeType="mainSeq">
-                <p:childTnLst>
-                  <p:par>
-                    <p:cTn id="3" fill="hold">
-                      <p:stCondLst>
-                        <p:cond delay="indefinite"/>
-                      </p:stCondLst>
-                      <p:childTnLst>
-                        <p:par>
-                          <p:cTn id="4" fill="hold">
-                            <p:stCondLst>
-                              <p:cond delay="0"/>
-                            </p:stCondLst>
-                            <p:childTnLst>
-                              <p:par>
-                                <p:cTn id="5" presetID="42" presetClass="entr" presetSubtype="0" fill="hold" grpId="0" nodeType="clickEffect">
-                                  <p:stCondLst>
-                                    <p:cond delay="0"/>
-                                  </p:stCondLst>
-                                  <p:childTnLst>
-                                    <p:set>
-                                      <p:cBhvr>
-                                        <p:cTn id="6" dur="1" fill="hold">
-                                          <p:stCondLst>
-                                            <p:cond delay="0"/>
-                                          </p:stCondLst>
-                                        </p:cTn>
-                                        <p:tgtEl>
-                                          <p:spTgt spid="3">
-                                            <p:txEl>
-                                              <p:pRg st="0" end="0"/>
-                                            </p:txEl>
-                                          </p:spTgt>
-                                        </p:tgtEl>
-                                        <p:attrNameLst>
-                                          <p:attrName>style.visibility</p:attrName>
-                                        </p:attrNameLst>
-                                      </p:cBhvr>
-                                      <p:to>
-                                        <p:strVal val="visible"/>
-                                      </p:to>
-                                    </p:set>
-                                    <p:animEffect transition="in" filter="fade">
-                                      <p:cBhvr>
-                                        <p:cTn id="7" dur="1000"/>
-                                        <p:tgtEl>
-                                          <p:spTgt spid="3">
-                                            <p:txEl>
-                                              <p:pRg st="0" end="0"/>
-                                            </p:txEl>
-                                          </p:spTgt>
-                                        </p:tgtEl>
-                                      </p:cBhvr>
-                                    </p:animEffect>
-                                    <p:anim calcmode="lin" valueType="num">
-                                      <p:cBhvr>
-                                        <p:cTn id="8" dur="1000" fill="hold"/>
-                                        <p:tgtEl>
-                                          <p:spTgt spid="3">
-                                            <p:txEl>
-                                              <p:pRg st="0" end="0"/>
-                                            </p:txEl>
-                                          </p:spTgt>
-                                        </p:tgtEl>
-                                        <p:attrNameLst>
-                                          <p:attrName>ppt_x</p:attrName>
-                                        </p:attrNameLst>
-                                      </p:cBhvr>
-                                      <p:tavLst>
-                                        <p:tav tm="0">
-                                          <p:val>
-                                            <p:strVal val="#ppt_x"/>
-                                          </p:val>
-                                        </p:tav>
-                                        <p:tav tm="100000">
-                                          <p:val>
-                                            <p:strVal val="#ppt_x"/>
-                                          </p:val>
-                                        </p:tav>
-                                      </p:tavLst>
-                                    </p:anim>
-                                    <p:anim calcmode="lin" valueType="num">
-                                      <p:cBhvr>
-                                        <p:cTn id="9" dur="1000" fill="hold"/>
-                                        <p:tgtEl>
-                                          <p:spTgt spid="3">
-                                            <p:txEl>
-                                              <p:pRg st="0" end="0"/>
-                                            </p:txEl>
-                                          </p:spTgt>
-                                        </p:tgtEl>
-                                        <p:attrNameLst>
-                                          <p:attrName>ppt_y</p:attrName>
-                                        </p:attrNameLst>
-                                      </p:cBhvr>
-                                      <p:tavLst>
-                                        <p:tav tm="0">
-                                          <p:val>
-                                            <p:strVal val="#ppt_y+.1"/>
-                                          </p:val>
-                                        </p:tav>
-                                        <p:tav tm="100000">
-                                          <p:val>
-                                            <p:strVal val="#ppt_y"/>
-                                          </p:val>
-                                        </p:tav>
-                                      </p:tavLst>
-                                    </p:anim>
-                                  </p:childTnLst>
-                                </p:cTn>
-                              </p:par>
-                              <p:par>
-                                <p:cTn id="10" presetID="42" presetClass="entr" presetSubtype="0" fill="hold" nodeType="withEffect">
-                                  <p:stCondLst>
-                                    <p:cond delay="0"/>
-                                  </p:stCondLst>
-                                  <p:childTnLst>
-                                    <p:set>
-                                      <p:cBhvr>
-                                        <p:cTn id="11" dur="1" fill="hold">
-                                          <p:stCondLst>
-                                            <p:cond delay="0"/>
-                                          </p:stCondLst>
-                                        </p:cTn>
-                                        <p:tgtEl>
-                                          <p:spTgt spid="7"/>
-                                        </p:tgtEl>
-                                        <p:attrNameLst>
-                                          <p:attrName>style.visibility</p:attrName>
-                                        </p:attrNameLst>
-                                      </p:cBhvr>
-                                      <p:to>
-                                        <p:strVal val="visible"/>
-                                      </p:to>
-                                    </p:set>
-                                    <p:animEffect transition="in" filter="fade">
-                                      <p:cBhvr>
-                                        <p:cTn id="12" dur="1000"/>
-                                        <p:tgtEl>
-                                          <p:spTgt spid="7"/>
-                                        </p:tgtEl>
-                                      </p:cBhvr>
-                                    </p:animEffect>
-                                    <p:anim calcmode="lin" valueType="num">
-                                      <p:cBhvr>
-                                        <p:cTn id="13" dur="1000" fill="hold"/>
-                                        <p:tgtEl>
-                                          <p:spTgt spid="7"/>
-                                        </p:tgtEl>
-                                        <p:attrNameLst>
-                                          <p:attrName>ppt_x</p:attrName>
-                                        </p:attrNameLst>
-                                      </p:cBhvr>
-                                      <p:tavLst>
-                                        <p:tav tm="0">
-                                          <p:val>
-                                            <p:strVal val="#ppt_x"/>
-                                          </p:val>
-                                        </p:tav>
-                                        <p:tav tm="100000">
-                                          <p:val>
-                                            <p:strVal val="#ppt_x"/>
-                                          </p:val>
-                                        </p:tav>
-                                      </p:tavLst>
-                                    </p:anim>
-                                    <p:anim calcmode="lin" valueType="num">
-                                      <p:cBhvr>
-                                        <p:cTn id="14" dur="1000" fill="hold"/>
-                                        <p:tgtEl>
-                                          <p:spTgt spid="7"/>
-                                        </p:tgtEl>
-                                        <p:attrNameLst>
-                                          <p:attrName>ppt_y</p:attrName>
-                                        </p:attrNameLst>
-                                      </p:cBhvr>
-                                      <p:tavLst>
-                                        <p:tav tm="0">
-                                          <p:val>
-                                            <p:strVal val="#ppt_y+.1"/>
-                                          </p:val>
-                                        </p:tav>
-                                        <p:tav tm="100000">
-                                          <p:val>
-                                            <p:strVal val="#ppt_y"/>
-                                          </p:val>
-                                        </p:tav>
-                                      </p:tavLst>
-                                    </p:anim>
-                                  </p:childTnLst>
-                                </p:cTn>
-                              </p:par>
-                            </p:childTnLst>
-                          </p:cTn>
-                        </p:par>
-                      </p:childTnLst>
-                    </p:cTn>
-                  </p:par>
-                </p:childTnLst>
-              </p:cTn>
-              <p:prevCondLst>
-                <p:cond evt="onPrev" delay="0">
-                  <p:tgtEl>
-                    <p:sldTgt/>
-                  </p:tgtEl>
-                </p:cond>
-              </p:prevCondLst>
-              <p:nextCondLst>
-                <p:cond evt="onNext" delay="0">
-                  <p:tgtEl>
-                    <p:sldTgt/>
-                  </p:tgtEl>
-                </p:cond>
-              </p:nextCondLst>
-            </p:seq>
-          </p:childTnLst>
-        </p:cTn>
-      </p:par>
-    </p:tnLst>
-    <p:bldLst>
-      <p:bldP spid="3" grpId="0" build="p"/>
-    </p:bldLst>
-  </p:timing>
-</p:sld>
-</file>
-
 <file path=ppt/slides/slide2.xml><?xml version="1.0" encoding="utf-8"?>
 <p:sld xmlns:a="http://schemas.openxmlformats.org/drawingml/2006/main" xmlns:r="http://schemas.openxmlformats.org/officeDocument/2006/relationships" xmlns:p="http://schemas.openxmlformats.org/presentationml/2006/main">
   <p:cSld>
@@ -4776,8 +4340,8 @@
         </p:nvSpPr>
         <p:spPr>
           <a:xfrm>
-            <a:off x="1505622" y="1656678"/>
-            <a:ext cx="9180755" cy="4219071"/>
+            <a:off x="1505622" y="1790903"/>
+            <a:ext cx="9180755" cy="3745832"/>
           </a:xfrm>
         </p:spPr>
         <p:txBody>
@@ -4836,19 +4400,6 @@
                 </a:solidFill>
               </a:rPr>
               <a:t>Komponentenstruktur</a:t>
-            </a:r>
-          </a:p>
-          <a:p>
-            <a:pPr marL="514350" indent="-514350">
-              <a:buAutoNum type="arabicPeriod"/>
-            </a:pPr>
-            <a:r>
-              <a:rPr lang="de-DE" dirty="0">
-                <a:solidFill>
-                  <a:schemeClr val="bg1"/>
-                </a:solidFill>
-              </a:rPr>
-              <a:t>Datenstruktur</a:t>
             </a:r>
           </a:p>
           <a:p>
@@ -5125,7 +4676,7 @@
                   <a:schemeClr val="bg1"/>
                 </a:solidFill>
               </a:rPr>
-              <a:t>2  Benutzergruppen: Kunden und Admins</a:t>
+              <a:t>Zwei Benutzergruppen: Kunden und Admins</a:t>
             </a:r>
           </a:p>
           <a:p>
@@ -6467,7 +6018,7 @@
           <p:cNvPr id="2" name="Titel 1">
             <a:extLst>
               <a:ext uri="{FF2B5EF4-FFF2-40B4-BE49-F238E27FC236}">
-                <a16:creationId xmlns:a16="http://schemas.microsoft.com/office/drawing/2014/main" id="{CB7F7B21-7ADB-48FB-BDD5-4FED975B2694}"/>
+                <a16:creationId xmlns:a16="http://schemas.microsoft.com/office/drawing/2014/main" id="{E00DCCBD-3D90-497D-BF0A-FB58872785E6}"/>
               </a:ext>
             </a:extLst>
           </p:cNvPr>
@@ -6480,8 +6031,8 @@
         </p:nvSpPr>
         <p:spPr>
           <a:xfrm>
-            <a:off x="1492542" y="131975"/>
-            <a:ext cx="8880081" cy="729154"/>
+            <a:off x="1576432" y="365125"/>
+            <a:ext cx="7626292" cy="1325563"/>
           </a:xfrm>
         </p:spPr>
         <p:txBody>
@@ -6496,7 +6047,7 @@
                   <a:schemeClr val="bg1"/>
                 </a:solidFill>
               </a:rPr>
-              <a:t>4. Datenstruktur</a:t>
+              <a:t>4. Präsentation der Anwendung</a:t>
             </a:r>
           </a:p>
         </p:txBody>
@@ -6506,7 +6057,7 @@
           <p:cNvPr id="8" name="Inhaltsplatzhalter 7">
             <a:extLst>
               <a:ext uri="{FF2B5EF4-FFF2-40B4-BE49-F238E27FC236}">
-                <a16:creationId xmlns:a16="http://schemas.microsoft.com/office/drawing/2014/main" id="{2A5E6DB3-8829-4E61-94E2-8434EDDF1C4A}"/>
+                <a16:creationId xmlns:a16="http://schemas.microsoft.com/office/drawing/2014/main" id="{ED8E91CE-504F-4A5F-9F86-A20C465CDEE1}"/>
               </a:ext>
             </a:extLst>
           </p:cNvPr>
@@ -6531,8 +6082,8 @@
         </p:blipFill>
         <p:spPr>
           <a:xfrm>
-            <a:off x="1819377" y="843862"/>
-            <a:ext cx="8554132" cy="5427370"/>
+            <a:off x="5210498" y="2543498"/>
+            <a:ext cx="1771004" cy="1771004"/>
           </a:xfrm>
         </p:spPr>
       </p:pic>
@@ -6541,7 +6092,7 @@
           <p:cNvPr id="4" name="Datumsplatzhalter 3">
             <a:extLst>
               <a:ext uri="{FF2B5EF4-FFF2-40B4-BE49-F238E27FC236}">
-                <a16:creationId xmlns:a16="http://schemas.microsoft.com/office/drawing/2014/main" id="{FF93CE83-8DC8-468B-8EBC-C29DE6873244}"/>
+                <a16:creationId xmlns:a16="http://schemas.microsoft.com/office/drawing/2014/main" id="{A2B7F9FC-3579-48D2-B4DF-F89F02B2687E}"/>
               </a:ext>
             </a:extLst>
           </p:cNvPr>
@@ -6570,7 +6121,7 @@
           <p:cNvPr id="5" name="Fußzeilenplatzhalter 4">
             <a:extLst>
               <a:ext uri="{FF2B5EF4-FFF2-40B4-BE49-F238E27FC236}">
-                <a16:creationId xmlns:a16="http://schemas.microsoft.com/office/drawing/2014/main" id="{25252405-7E99-418D-BAE7-B8F17ADC0C56}"/>
+                <a16:creationId xmlns:a16="http://schemas.microsoft.com/office/drawing/2014/main" id="{B7A38C54-3C6F-448D-90FE-7E1F31EE5EB4}"/>
               </a:ext>
             </a:extLst>
           </p:cNvPr>
@@ -6599,7 +6150,7 @@
           <p:cNvPr id="6" name="Foliennummernplatzhalter 5">
             <a:extLst>
               <a:ext uri="{FF2B5EF4-FFF2-40B4-BE49-F238E27FC236}">
-                <a16:creationId xmlns:a16="http://schemas.microsoft.com/office/drawing/2014/main" id="{A3B680E9-3B87-41D8-A1E0-EEDE9EAEA098}"/>
+                <a16:creationId xmlns:a16="http://schemas.microsoft.com/office/drawing/2014/main" id="{5766BA71-14E7-42B7-8156-84076C6122C8}"/>
               </a:ext>
             </a:extLst>
           </p:cNvPr>
@@ -6627,7 +6178,7 @@
     </p:spTree>
     <p:extLst>
       <p:ext uri="{BB962C8B-B14F-4D97-AF65-F5344CB8AC3E}">
-        <p14:creationId xmlns:p14="http://schemas.microsoft.com/office/powerpoint/2010/main" val="498559357"/>
+        <p14:creationId xmlns:p14="http://schemas.microsoft.com/office/powerpoint/2010/main" val="221449830"/>
       </p:ext>
     </p:extLst>
   </p:cSld>
@@ -6659,7 +6210,7 @@
           <p:cNvPr id="2" name="Titel 1">
             <a:extLst>
               <a:ext uri="{FF2B5EF4-FFF2-40B4-BE49-F238E27FC236}">
-                <a16:creationId xmlns:a16="http://schemas.microsoft.com/office/drawing/2014/main" id="{E00DCCBD-3D90-497D-BF0A-FB58872785E6}"/>
+                <a16:creationId xmlns:a16="http://schemas.microsoft.com/office/drawing/2014/main" id="{26842293-1090-4991-BD73-7DF2ABC21BAD}"/>
               </a:ext>
             </a:extLst>
           </p:cNvPr>
@@ -6672,8 +6223,8 @@
         </p:nvSpPr>
         <p:spPr>
           <a:xfrm>
-            <a:off x="1576432" y="365125"/>
-            <a:ext cx="7626292" cy="1325563"/>
+            <a:off x="1584821" y="365125"/>
+            <a:ext cx="9538981" cy="1325563"/>
           </a:xfrm>
         </p:spPr>
         <p:txBody>
@@ -6688,7 +6239,7 @@
                   <a:schemeClr val="bg1"/>
                 </a:solidFill>
               </a:rPr>
-              <a:t>5. Präsentation der Anwendung</a:t>
+              <a:t>5. Code-Teile </a:t>
             </a:r>
           </a:p>
         </p:txBody>
@@ -6698,7 +6249,7 @@
           <p:cNvPr id="8" name="Inhaltsplatzhalter 7">
             <a:extLst>
               <a:ext uri="{FF2B5EF4-FFF2-40B4-BE49-F238E27FC236}">
-                <a16:creationId xmlns:a16="http://schemas.microsoft.com/office/drawing/2014/main" id="{ED8E91CE-504F-4A5F-9F86-A20C465CDEE1}"/>
+                <a16:creationId xmlns:a16="http://schemas.microsoft.com/office/drawing/2014/main" id="{289BDAE9-6042-4726-8E2B-000F11697282}"/>
               </a:ext>
             </a:extLst>
           </p:cNvPr>
@@ -6723,9 +6274,18 @@
         </p:blipFill>
         <p:spPr>
           <a:xfrm>
-            <a:off x="5210498" y="2543498"/>
-            <a:ext cx="1771004" cy="1771004"/>
+            <a:off x="4577068" y="2574601"/>
+            <a:ext cx="3037864" cy="1708798"/>
           </a:xfrm>
+          <a:prstGeom prst="rect">
+            <a:avLst/>
+          </a:prstGeom>
+          <a:ln>
+            <a:noFill/>
+          </a:ln>
+          <a:effectLst>
+            <a:softEdge rad="112500"/>
+          </a:effectLst>
         </p:spPr>
       </p:pic>
       <p:sp>
@@ -6733,7 +6293,7 @@
           <p:cNvPr id="4" name="Datumsplatzhalter 3">
             <a:extLst>
               <a:ext uri="{FF2B5EF4-FFF2-40B4-BE49-F238E27FC236}">
-                <a16:creationId xmlns:a16="http://schemas.microsoft.com/office/drawing/2014/main" id="{A2B7F9FC-3579-48D2-B4DF-F89F02B2687E}"/>
+                <a16:creationId xmlns:a16="http://schemas.microsoft.com/office/drawing/2014/main" id="{C3104266-5315-4359-B5C0-01A3DF5A8492}"/>
               </a:ext>
             </a:extLst>
           </p:cNvPr>
@@ -6762,7 +6322,7 @@
           <p:cNvPr id="5" name="Fußzeilenplatzhalter 4">
             <a:extLst>
               <a:ext uri="{FF2B5EF4-FFF2-40B4-BE49-F238E27FC236}">
-                <a16:creationId xmlns:a16="http://schemas.microsoft.com/office/drawing/2014/main" id="{B7A38C54-3C6F-448D-90FE-7E1F31EE5EB4}"/>
+                <a16:creationId xmlns:a16="http://schemas.microsoft.com/office/drawing/2014/main" id="{3670F215-9EC4-4979-AED6-97FED653133F}"/>
               </a:ext>
             </a:extLst>
           </p:cNvPr>
@@ -6791,7 +6351,7 @@
           <p:cNvPr id="6" name="Foliennummernplatzhalter 5">
             <a:extLst>
               <a:ext uri="{FF2B5EF4-FFF2-40B4-BE49-F238E27FC236}">
-                <a16:creationId xmlns:a16="http://schemas.microsoft.com/office/drawing/2014/main" id="{5766BA71-14E7-42B7-8156-84076C6122C8}"/>
+                <a16:creationId xmlns:a16="http://schemas.microsoft.com/office/drawing/2014/main" id="{F7810221-B408-47B3-9418-10BF2B95FD8C}"/>
               </a:ext>
             </a:extLst>
           </p:cNvPr>
@@ -6819,7 +6379,7 @@
     </p:spTree>
     <p:extLst>
       <p:ext uri="{BB962C8B-B14F-4D97-AF65-F5344CB8AC3E}">
-        <p14:creationId xmlns:p14="http://schemas.microsoft.com/office/powerpoint/2010/main" val="221449830"/>
+        <p14:creationId xmlns:p14="http://schemas.microsoft.com/office/powerpoint/2010/main" val="3378087648"/>
       </p:ext>
     </p:extLst>
   </p:cSld>
@@ -6851,7 +6411,7 @@
           <p:cNvPr id="2" name="Titel 1">
             <a:extLst>
               <a:ext uri="{FF2B5EF4-FFF2-40B4-BE49-F238E27FC236}">
-                <a16:creationId xmlns:a16="http://schemas.microsoft.com/office/drawing/2014/main" id="{26842293-1090-4991-BD73-7DF2ABC21BAD}"/>
+                <a16:creationId xmlns:a16="http://schemas.microsoft.com/office/drawing/2014/main" id="{5DB718D4-99DF-4500-91AB-659F33821A6C}"/>
               </a:ext>
             </a:extLst>
           </p:cNvPr>
@@ -6864,8 +6424,8 @@
         </p:nvSpPr>
         <p:spPr>
           <a:xfrm>
-            <a:off x="1584821" y="365125"/>
-            <a:ext cx="9538981" cy="1325563"/>
+            <a:off x="1568042" y="365125"/>
+            <a:ext cx="9505425" cy="1325563"/>
           </a:xfrm>
         </p:spPr>
         <p:txBody>
@@ -6880,7 +6440,7 @@
                   <a:schemeClr val="bg1"/>
                 </a:solidFill>
               </a:rPr>
-              <a:t>6. Code-Teile </a:t>
+              <a:t>6. Erweiterungen und Ausblick</a:t>
             </a:r>
           </a:p>
         </p:txBody>
@@ -6890,7 +6450,7 @@
           <p:cNvPr id="3" name="Inhaltsplatzhalter 2">
             <a:extLst>
               <a:ext uri="{FF2B5EF4-FFF2-40B4-BE49-F238E27FC236}">
-                <a16:creationId xmlns:a16="http://schemas.microsoft.com/office/drawing/2014/main" id="{38875CDC-5D56-4F4F-9533-6600ECBAE33B}"/>
+                <a16:creationId xmlns:a16="http://schemas.microsoft.com/office/drawing/2014/main" id="{438F4C7E-DAF4-4796-8B79-2F5D32E72240}"/>
               </a:ext>
             </a:extLst>
           </p:cNvPr>
@@ -6901,12 +6461,62 @@
             <p:ph idx="1"/>
           </p:nvPr>
         </p:nvSpPr>
-        <p:spPr/>
+        <p:spPr>
+          <a:xfrm>
+            <a:off x="1568042" y="1825625"/>
+            <a:ext cx="9505425" cy="4351338"/>
+          </a:xfrm>
+        </p:spPr>
         <p:txBody>
           <a:bodyPr/>
           <a:lstStyle/>
           <a:p>
-            <a:endParaRPr lang="de-DE" dirty="0"/>
+            <a:pPr marL="0" indent="0">
+              <a:buNone/>
+            </a:pPr>
+            <a:endParaRPr lang="de-DE" dirty="0">
+              <a:solidFill>
+                <a:schemeClr val="bg1"/>
+              </a:solidFill>
+            </a:endParaRPr>
+          </a:p>
+          <a:p>
+            <a:r>
+              <a:rPr lang="de-DE" dirty="0" err="1">
+                <a:solidFill>
+                  <a:schemeClr val="bg1"/>
+                </a:solidFill>
+              </a:rPr>
+              <a:t>C#nema</a:t>
+            </a:r>
+            <a:r>
+              <a:rPr lang="de-DE" dirty="0">
+                <a:solidFill>
+                  <a:schemeClr val="bg1"/>
+                </a:solidFill>
+              </a:rPr>
+              <a:t> für vielfältige Erweiterungen offen</a:t>
+            </a:r>
+          </a:p>
+          <a:p>
+            <a:endParaRPr lang="de-DE" dirty="0">
+              <a:solidFill>
+                <a:schemeClr val="bg1"/>
+              </a:solidFill>
+            </a:endParaRPr>
+          </a:p>
+          <a:p>
+            <a:pPr marL="0" indent="0">
+              <a:buNone/>
+            </a:pPr>
+            <a:r>
+              <a:rPr lang="de-DE" dirty="0">
+                <a:solidFill>
+                  <a:schemeClr val="bg1"/>
+                </a:solidFill>
+              </a:rPr>
+              <a:t>z.B. Filmvorschläge basierend auf früheren Bestellungen und Bewertungen eines Kunden </a:t>
+            </a:r>
           </a:p>
         </p:txBody>
       </p:sp>
@@ -6915,7 +6525,7 @@
           <p:cNvPr id="4" name="Datumsplatzhalter 3">
             <a:extLst>
               <a:ext uri="{FF2B5EF4-FFF2-40B4-BE49-F238E27FC236}">
-                <a16:creationId xmlns:a16="http://schemas.microsoft.com/office/drawing/2014/main" id="{C3104266-5315-4359-B5C0-01A3DF5A8492}"/>
+                <a16:creationId xmlns:a16="http://schemas.microsoft.com/office/drawing/2014/main" id="{D3F20C2A-4F73-415A-B2EF-2B1BFBE5FFD2}"/>
               </a:ext>
             </a:extLst>
           </p:cNvPr>
@@ -6944,7 +6554,7 @@
           <p:cNvPr id="5" name="Fußzeilenplatzhalter 4">
             <a:extLst>
               <a:ext uri="{FF2B5EF4-FFF2-40B4-BE49-F238E27FC236}">
-                <a16:creationId xmlns:a16="http://schemas.microsoft.com/office/drawing/2014/main" id="{3670F215-9EC4-4979-AED6-97FED653133F}"/>
+                <a16:creationId xmlns:a16="http://schemas.microsoft.com/office/drawing/2014/main" id="{58FEBEF4-BECE-46D3-BB2B-DF099366D41B}"/>
               </a:ext>
             </a:extLst>
           </p:cNvPr>
@@ -6973,7 +6583,7 @@
           <p:cNvPr id="6" name="Foliennummernplatzhalter 5">
             <a:extLst>
               <a:ext uri="{FF2B5EF4-FFF2-40B4-BE49-F238E27FC236}">
-                <a16:creationId xmlns:a16="http://schemas.microsoft.com/office/drawing/2014/main" id="{F7810221-B408-47B3-9418-10BF2B95FD8C}"/>
+                <a16:creationId xmlns:a16="http://schemas.microsoft.com/office/drawing/2014/main" id="{6682DDF6-AD31-4BDA-95F2-F66A2971963F}"/>
               </a:ext>
             </a:extLst>
           </p:cNvPr>
@@ -7001,7 +6611,7 @@
     </p:spTree>
     <p:extLst>
       <p:ext uri="{BB962C8B-B14F-4D97-AF65-F5344CB8AC3E}">
-        <p14:creationId xmlns:p14="http://schemas.microsoft.com/office/powerpoint/2010/main" val="3378087648"/>
+        <p14:creationId xmlns:p14="http://schemas.microsoft.com/office/powerpoint/2010/main" val="3608073810"/>
       </p:ext>
     </p:extLst>
   </p:cSld>
@@ -7030,24 +6640,24 @@
       </p:grpSpPr>
       <p:sp>
         <p:nvSpPr>
-          <p:cNvPr id="2" name="Titel 1">
-            <a:extLst>
-              <a:ext uri="{FF2B5EF4-FFF2-40B4-BE49-F238E27FC236}">
-                <a16:creationId xmlns:a16="http://schemas.microsoft.com/office/drawing/2014/main" id="{5DB718D4-99DF-4500-91AB-659F33821A6C}"/>
-              </a:ext>
-            </a:extLst>
-          </p:cNvPr>
-          <p:cNvSpPr>
-            <a:spLocks noGrp="1"/>
-          </p:cNvSpPr>
-          <p:nvPr>
-            <p:ph type="title"/>
+          <p:cNvPr id="3" name="Inhaltsplatzhalter 2">
+            <a:extLst>
+              <a:ext uri="{FF2B5EF4-FFF2-40B4-BE49-F238E27FC236}">
+                <a16:creationId xmlns:a16="http://schemas.microsoft.com/office/drawing/2014/main" id="{624FDB27-9E2B-444F-8181-C8B9F1B49BAA}"/>
+              </a:ext>
+            </a:extLst>
+          </p:cNvPr>
+          <p:cNvSpPr>
+            <a:spLocks noGrp="1"/>
+          </p:cNvSpPr>
+          <p:nvPr>
+            <p:ph idx="1"/>
           </p:nvPr>
         </p:nvSpPr>
         <p:spPr>
           <a:xfrm>
-            <a:off x="1568042" y="365125"/>
-            <a:ext cx="9505425" cy="1325563"/>
+            <a:off x="838200" y="1355842"/>
+            <a:ext cx="10515600" cy="1815198"/>
           </a:xfrm>
         </p:spPr>
         <p:txBody>
@@ -7056,88 +6666,16 @@
           </a:bodyPr>
           <a:lstStyle/>
           <a:p>
-            <a:r>
-              <a:rPr lang="de-DE" sz="4000" b="1" dirty="0">
+            <a:pPr marL="0" indent="0" algn="ctr">
+              <a:buNone/>
+            </a:pPr>
+            <a:r>
+              <a:rPr lang="de-DE" sz="6000" b="1" dirty="0">
                 <a:solidFill>
                   <a:schemeClr val="bg1"/>
                 </a:solidFill>
               </a:rPr>
-              <a:t>7. Erweiterungen und Ausblick</a:t>
-            </a:r>
-          </a:p>
-        </p:txBody>
-      </p:sp>
-      <p:sp>
-        <p:nvSpPr>
-          <p:cNvPr id="3" name="Inhaltsplatzhalter 2">
-            <a:extLst>
-              <a:ext uri="{FF2B5EF4-FFF2-40B4-BE49-F238E27FC236}">
-                <a16:creationId xmlns:a16="http://schemas.microsoft.com/office/drawing/2014/main" id="{438F4C7E-DAF4-4796-8B79-2F5D32E72240}"/>
-              </a:ext>
-            </a:extLst>
-          </p:cNvPr>
-          <p:cNvSpPr>
-            <a:spLocks noGrp="1"/>
-          </p:cNvSpPr>
-          <p:nvPr>
-            <p:ph idx="1"/>
-          </p:nvPr>
-        </p:nvSpPr>
-        <p:spPr>
-          <a:xfrm>
-            <a:off x="1568042" y="1825625"/>
-            <a:ext cx="9505425" cy="4351338"/>
-          </a:xfrm>
-        </p:spPr>
-        <p:txBody>
-          <a:bodyPr/>
-          <a:lstStyle/>
-          <a:p>
-            <a:pPr marL="0" indent="0">
-              <a:buNone/>
-            </a:pPr>
-            <a:endParaRPr lang="de-DE" dirty="0">
-              <a:solidFill>
-                <a:schemeClr val="bg1"/>
-              </a:solidFill>
-            </a:endParaRPr>
-          </a:p>
-          <a:p>
-            <a:r>
-              <a:rPr lang="de-DE" dirty="0" err="1">
-                <a:solidFill>
-                  <a:schemeClr val="bg1"/>
-                </a:solidFill>
-              </a:rPr>
-              <a:t>C#nema</a:t>
-            </a:r>
-            <a:r>
-              <a:rPr lang="de-DE" dirty="0">
-                <a:solidFill>
-                  <a:schemeClr val="bg1"/>
-                </a:solidFill>
-              </a:rPr>
-              <a:t> für vielfältige Erweiterungen offen</a:t>
-            </a:r>
-          </a:p>
-          <a:p>
-            <a:endParaRPr lang="de-DE" dirty="0">
-              <a:solidFill>
-                <a:schemeClr val="bg1"/>
-              </a:solidFill>
-            </a:endParaRPr>
-          </a:p>
-          <a:p>
-            <a:pPr marL="0" indent="0">
-              <a:buNone/>
-            </a:pPr>
-            <a:r>
-              <a:rPr lang="de-DE" dirty="0">
-                <a:solidFill>
-                  <a:schemeClr val="bg1"/>
-                </a:solidFill>
-              </a:rPr>
-              <a:t>z.B. Filmvorschläge basierend auf früheren Bestellungen und Bewertungen eines Kunden </a:t>
+              <a:t>Vielen Dank für Ihre Aufmerksamkeit!</a:t>
             </a:r>
           </a:p>
         </p:txBody>
@@ -7147,7 +6685,7 @@
           <p:cNvPr id="4" name="Datumsplatzhalter 3">
             <a:extLst>
               <a:ext uri="{FF2B5EF4-FFF2-40B4-BE49-F238E27FC236}">
-                <a16:creationId xmlns:a16="http://schemas.microsoft.com/office/drawing/2014/main" id="{D3F20C2A-4F73-415A-B2EF-2B1BFBE5FFD2}"/>
+                <a16:creationId xmlns:a16="http://schemas.microsoft.com/office/drawing/2014/main" id="{A7A59E71-CF6A-4AC8-B590-D26831A03599}"/>
               </a:ext>
             </a:extLst>
           </p:cNvPr>
@@ -7176,7 +6714,7 @@
           <p:cNvPr id="5" name="Fußzeilenplatzhalter 4">
             <a:extLst>
               <a:ext uri="{FF2B5EF4-FFF2-40B4-BE49-F238E27FC236}">
-                <a16:creationId xmlns:a16="http://schemas.microsoft.com/office/drawing/2014/main" id="{58FEBEF4-BECE-46D3-BB2B-DF099366D41B}"/>
+                <a16:creationId xmlns:a16="http://schemas.microsoft.com/office/drawing/2014/main" id="{58CB982E-5159-47F1-90B2-A070A4E8CFF8}"/>
               </a:ext>
             </a:extLst>
           </p:cNvPr>
@@ -7205,7 +6743,7 @@
           <p:cNvPr id="6" name="Foliennummernplatzhalter 5">
             <a:extLst>
               <a:ext uri="{FF2B5EF4-FFF2-40B4-BE49-F238E27FC236}">
-                <a16:creationId xmlns:a16="http://schemas.microsoft.com/office/drawing/2014/main" id="{6682DDF6-AD31-4BDA-95F2-F66A2971963F}"/>
+                <a16:creationId xmlns:a16="http://schemas.microsoft.com/office/drawing/2014/main" id="{A84F22F8-791C-401F-865F-FA5923FE32A5}"/>
               </a:ext>
             </a:extLst>
           </p:cNvPr>
@@ -7230,16 +6768,291 @@
           </a:p>
         </p:txBody>
       </p:sp>
+      <p:pic>
+        <p:nvPicPr>
+          <p:cNvPr id="7" name="Grafik 6">
+            <a:extLst>
+              <a:ext uri="{FF2B5EF4-FFF2-40B4-BE49-F238E27FC236}">
+                <a16:creationId xmlns:a16="http://schemas.microsoft.com/office/drawing/2014/main" id="{118131DD-61D1-49FC-A587-BEFCF48E833B}"/>
+              </a:ext>
+            </a:extLst>
+          </p:cNvPr>
+          <p:cNvPicPr>
+            <a:picLocks noChangeAspect="1"/>
+          </p:cNvPicPr>
+          <p:nvPr/>
+        </p:nvPicPr>
+        <p:blipFill>
+          <a:blip r:embed="rId2">
+            <a:extLst>
+              <a:ext uri="{28A0092B-C50C-407E-A947-70E740481C1C}">
+                <a14:useLocalDpi xmlns:a14="http://schemas.microsoft.com/office/drawing/2010/main" val="0"/>
+              </a:ext>
+            </a:extLst>
+          </a:blip>
+          <a:stretch>
+            <a:fillRect/>
+          </a:stretch>
+        </p:blipFill>
+        <p:spPr>
+          <a:xfrm>
+            <a:off x="5085282" y="3568760"/>
+            <a:ext cx="2021435" cy="1516076"/>
+          </a:xfrm>
+          <a:prstGeom prst="rect">
+            <a:avLst/>
+          </a:prstGeom>
+          <a:ln>
+            <a:noFill/>
+          </a:ln>
+          <a:effectLst>
+            <a:outerShdw blurRad="292100" dist="139700" dir="2700000" algn="tl" rotWithShape="0">
+              <a:srgbClr val="333333">
+                <a:alpha val="65000"/>
+              </a:srgbClr>
+            </a:outerShdw>
+          </a:effectLst>
+        </p:spPr>
+      </p:pic>
     </p:spTree>
     <p:extLst>
       <p:ext uri="{BB962C8B-B14F-4D97-AF65-F5344CB8AC3E}">
-        <p14:creationId xmlns:p14="http://schemas.microsoft.com/office/powerpoint/2010/main" val="3608073810"/>
+        <p14:creationId xmlns:p14="http://schemas.microsoft.com/office/powerpoint/2010/main" val="3075807771"/>
       </p:ext>
     </p:extLst>
   </p:cSld>
   <p:clrMapOvr>
     <a:masterClrMapping/>
   </p:clrMapOvr>
+  <p:timing>
+    <p:tnLst>
+      <p:par>
+        <p:cTn id="1" dur="indefinite" restart="never" nodeType="tmRoot">
+          <p:childTnLst>
+            <p:seq concurrent="1" nextAc="seek">
+              <p:cTn id="2" dur="indefinite" nodeType="mainSeq">
+                <p:childTnLst>
+                  <p:par>
+                    <p:cTn id="3" fill="hold">
+                      <p:stCondLst>
+                        <p:cond delay="indefinite"/>
+                      </p:stCondLst>
+                      <p:childTnLst>
+                        <p:par>
+                          <p:cTn id="4" fill="hold">
+                            <p:stCondLst>
+                              <p:cond delay="0"/>
+                            </p:stCondLst>
+                            <p:childTnLst>
+                              <p:par>
+                                <p:cTn id="5" presetID="42" presetClass="entr" presetSubtype="0" fill="hold" grpId="0" nodeType="clickEffect">
+                                  <p:stCondLst>
+                                    <p:cond delay="0"/>
+                                  </p:stCondLst>
+                                  <p:childTnLst>
+                                    <p:set>
+                                      <p:cBhvr>
+                                        <p:cTn id="6" dur="1" fill="hold">
+                                          <p:stCondLst>
+                                            <p:cond delay="0"/>
+                                          </p:stCondLst>
+                                        </p:cTn>
+                                        <p:tgtEl>
+                                          <p:spTgt spid="3">
+                                            <p:txEl>
+                                              <p:pRg st="0" end="0"/>
+                                            </p:txEl>
+                                          </p:spTgt>
+                                        </p:tgtEl>
+                                        <p:attrNameLst>
+                                          <p:attrName>style.visibility</p:attrName>
+                                        </p:attrNameLst>
+                                      </p:cBhvr>
+                                      <p:to>
+                                        <p:strVal val="visible"/>
+                                      </p:to>
+                                    </p:set>
+                                    <p:animEffect transition="in" filter="fade">
+                                      <p:cBhvr>
+                                        <p:cTn id="7" dur="1000"/>
+                                        <p:tgtEl>
+                                          <p:spTgt spid="3">
+                                            <p:txEl>
+                                              <p:pRg st="0" end="0"/>
+                                            </p:txEl>
+                                          </p:spTgt>
+                                        </p:tgtEl>
+                                      </p:cBhvr>
+                                    </p:animEffect>
+                                    <p:anim calcmode="lin" valueType="num">
+                                      <p:cBhvr>
+                                        <p:cTn id="8" dur="1000" fill="hold"/>
+                                        <p:tgtEl>
+                                          <p:spTgt spid="3">
+                                            <p:txEl>
+                                              <p:pRg st="0" end="0"/>
+                                            </p:txEl>
+                                          </p:spTgt>
+                                        </p:tgtEl>
+                                        <p:attrNameLst>
+                                          <p:attrName>ppt_x</p:attrName>
+                                        </p:attrNameLst>
+                                      </p:cBhvr>
+                                      <p:tavLst>
+                                        <p:tav tm="0">
+                                          <p:val>
+                                            <p:strVal val="#ppt_x"/>
+                                          </p:val>
+                                        </p:tav>
+                                        <p:tav tm="100000">
+                                          <p:val>
+                                            <p:strVal val="#ppt_x"/>
+                                          </p:val>
+                                        </p:tav>
+                                      </p:tavLst>
+                                    </p:anim>
+                                    <p:anim calcmode="lin" valueType="num">
+                                      <p:cBhvr>
+                                        <p:cTn id="9" dur="1000" fill="hold"/>
+                                        <p:tgtEl>
+                                          <p:spTgt spid="3">
+                                            <p:txEl>
+                                              <p:pRg st="0" end="0"/>
+                                            </p:txEl>
+                                          </p:spTgt>
+                                        </p:tgtEl>
+                                        <p:attrNameLst>
+                                          <p:attrName>ppt_y</p:attrName>
+                                        </p:attrNameLst>
+                                      </p:cBhvr>
+                                      <p:tavLst>
+                                        <p:tav tm="0">
+                                          <p:val>
+                                            <p:strVal val="#ppt_y+.1"/>
+                                          </p:val>
+                                        </p:tav>
+                                        <p:tav tm="100000">
+                                          <p:val>
+                                            <p:strVal val="#ppt_y"/>
+                                          </p:val>
+                                        </p:tav>
+                                      </p:tavLst>
+                                    </p:anim>
+                                  </p:childTnLst>
+                                </p:cTn>
+                              </p:par>
+                              <p:par>
+                                <p:cTn id="10" presetID="42" presetClass="entr" presetSubtype="0" fill="hold" nodeType="withEffect">
+                                  <p:stCondLst>
+                                    <p:cond delay="0"/>
+                                  </p:stCondLst>
+                                  <p:childTnLst>
+                                    <p:set>
+                                      <p:cBhvr>
+                                        <p:cTn id="11" dur="1" fill="hold">
+                                          <p:stCondLst>
+                                            <p:cond delay="0"/>
+                                          </p:stCondLst>
+                                        </p:cTn>
+                                        <p:tgtEl>
+                                          <p:spTgt spid="7"/>
+                                        </p:tgtEl>
+                                        <p:attrNameLst>
+                                          <p:attrName>style.visibility</p:attrName>
+                                        </p:attrNameLst>
+                                      </p:cBhvr>
+                                      <p:to>
+                                        <p:strVal val="visible"/>
+                                      </p:to>
+                                    </p:set>
+                                    <p:animEffect transition="in" filter="fade">
+                                      <p:cBhvr>
+                                        <p:cTn id="12" dur="1000"/>
+                                        <p:tgtEl>
+                                          <p:spTgt spid="7"/>
+                                        </p:tgtEl>
+                                      </p:cBhvr>
+                                    </p:animEffect>
+                                    <p:anim calcmode="lin" valueType="num">
+                                      <p:cBhvr>
+                                        <p:cTn id="13" dur="1000" fill="hold"/>
+                                        <p:tgtEl>
+                                          <p:spTgt spid="7"/>
+                                        </p:tgtEl>
+                                        <p:attrNameLst>
+                                          <p:attrName>ppt_x</p:attrName>
+                                        </p:attrNameLst>
+                                      </p:cBhvr>
+                                      <p:tavLst>
+                                        <p:tav tm="0">
+                                          <p:val>
+                                            <p:strVal val="#ppt_x"/>
+                                          </p:val>
+                                        </p:tav>
+                                        <p:tav tm="100000">
+                                          <p:val>
+                                            <p:strVal val="#ppt_x"/>
+                                          </p:val>
+                                        </p:tav>
+                                      </p:tavLst>
+                                    </p:anim>
+                                    <p:anim calcmode="lin" valueType="num">
+                                      <p:cBhvr>
+                                        <p:cTn id="14" dur="1000" fill="hold"/>
+                                        <p:tgtEl>
+                                          <p:spTgt spid="7"/>
+                                        </p:tgtEl>
+                                        <p:attrNameLst>
+                                          <p:attrName>ppt_y</p:attrName>
+                                        </p:attrNameLst>
+                                      </p:cBhvr>
+                                      <p:tavLst>
+                                        <p:tav tm="0">
+                                          <p:val>
+                                            <p:strVal val="#ppt_y+.1"/>
+                                          </p:val>
+                                        </p:tav>
+                                        <p:tav tm="100000">
+                                          <p:val>
+                                            <p:strVal val="#ppt_y"/>
+                                          </p:val>
+                                        </p:tav>
+                                      </p:tavLst>
+                                    </p:anim>
+                                  </p:childTnLst>
+                                </p:cTn>
+                              </p:par>
+                            </p:childTnLst>
+                          </p:cTn>
+                        </p:par>
+                      </p:childTnLst>
+                    </p:cTn>
+                  </p:par>
+                </p:childTnLst>
+              </p:cTn>
+              <p:prevCondLst>
+                <p:cond evt="onPrev" delay="0">
+                  <p:tgtEl>
+                    <p:sldTgt/>
+                  </p:tgtEl>
+                </p:cond>
+              </p:prevCondLst>
+              <p:nextCondLst>
+                <p:cond evt="onNext" delay="0">
+                  <p:tgtEl>
+                    <p:sldTgt/>
+                  </p:tgtEl>
+                </p:cond>
+              </p:nextCondLst>
+            </p:seq>
+          </p:childTnLst>
+        </p:cTn>
+      </p:par>
+    </p:tnLst>
+    <p:bldLst>
+      <p:bldP spid="3" grpId="0" build="p"/>
+    </p:bldLst>
+  </p:timing>
 </p:sld>
 </file>
 

</xml_diff>

<commit_message>
Ablaufplan und Präsentation aktualisiert
</commit_message>
<xml_diff>
--- a/Dokumente/Projektpräsentation_Cnema.pptx
+++ b/Dokumente/Projektpräsentation_Cnema.pptx
@@ -227,7 +227,7 @@
           <a:p>
             <a:fld id="{EBA475C9-CC36-4E7E-8CB4-2214DCFFA1FA}" type="datetimeFigureOut">
               <a:rPr lang="de-DE" smtClean="0"/>
-              <a:t>18.01.2018</a:t>
+              <a:t>23.01.2018</a:t>
             </a:fld>
             <a:endParaRPr lang="de-DE"/>
           </a:p>
@@ -404,7 +404,7 @@
           <a:p>
             <a:fld id="{846540AB-AE9D-4C3E-AEF1-110218B86D1E}" type="datetimeFigureOut">
               <a:rPr lang="de-DE" smtClean="0"/>
-              <a:t>18.01.2018</a:t>
+              <a:t>23.01.2018</a:t>
             </a:fld>
             <a:endParaRPr lang="de-DE"/>
           </a:p>
@@ -818,204 +818,6 @@
 </file>
 
 <file path=ppt/slideLayouts/slideLayout10.xml><?xml version="1.0" encoding="utf-8"?>
-<p:sldLayout xmlns:a="http://schemas.openxmlformats.org/drawingml/2006/main" xmlns:r="http://schemas.openxmlformats.org/officeDocument/2006/relationships" xmlns:p="http://schemas.openxmlformats.org/presentationml/2006/main" type="vertTx" preserve="1">
-  <p:cSld name="Titel und vertikaler Text">
-    <p:spTree>
-      <p:nvGrpSpPr>
-        <p:cNvPr id="1" name=""/>
-        <p:cNvGrpSpPr/>
-        <p:nvPr/>
-      </p:nvGrpSpPr>
-      <p:grpSpPr>
-        <a:xfrm>
-          <a:off x="0" y="0"/>
-          <a:ext cx="0" cy="0"/>
-          <a:chOff x="0" y="0"/>
-          <a:chExt cx="0" cy="0"/>
-        </a:xfrm>
-      </p:grpSpPr>
-      <p:sp>
-        <p:nvSpPr>
-          <p:cNvPr id="2" name="Titel 1">
-            <a:extLst>
-              <a:ext uri="{FF2B5EF4-FFF2-40B4-BE49-F238E27FC236}">
-                <a16:creationId xmlns:a16="http://schemas.microsoft.com/office/drawing/2014/main" id="{B9821B27-80D6-4175-AAEA-700C5057615E}"/>
-              </a:ext>
-            </a:extLst>
-          </p:cNvPr>
-          <p:cNvSpPr>
-            <a:spLocks noGrp="1"/>
-          </p:cNvSpPr>
-          <p:nvPr>
-            <p:ph type="title"/>
-          </p:nvPr>
-        </p:nvSpPr>
-        <p:spPr/>
-        <p:txBody>
-          <a:bodyPr/>
-          <a:lstStyle/>
-          <a:p>
-            <a:r>
-              <a:rPr lang="de-DE"/>
-              <a:t>Mastertitelformat bearbeiten</a:t>
-            </a:r>
-          </a:p>
-        </p:txBody>
-      </p:sp>
-      <p:sp>
-        <p:nvSpPr>
-          <p:cNvPr id="3" name="Vertikaler Textplatzhalter 2">
-            <a:extLst>
-              <a:ext uri="{FF2B5EF4-FFF2-40B4-BE49-F238E27FC236}">
-                <a16:creationId xmlns:a16="http://schemas.microsoft.com/office/drawing/2014/main" id="{BF68F219-96C8-4BBE-8B2C-4E16B3C69B85}"/>
-              </a:ext>
-            </a:extLst>
-          </p:cNvPr>
-          <p:cNvSpPr>
-            <a:spLocks noGrp="1"/>
-          </p:cNvSpPr>
-          <p:nvPr>
-            <p:ph type="body" orient="vert" idx="1"/>
-          </p:nvPr>
-        </p:nvSpPr>
-        <p:spPr/>
-        <p:txBody>
-          <a:bodyPr vert="eaVert"/>
-          <a:lstStyle/>
-          <a:p>
-            <a:pPr lvl="0"/>
-            <a:r>
-              <a:rPr lang="de-DE"/>
-              <a:t>Mastertextformat bearbeiten</a:t>
-            </a:r>
-          </a:p>
-          <a:p>
-            <a:pPr lvl="1"/>
-            <a:r>
-              <a:rPr lang="de-DE"/>
-              <a:t>Zweite Ebene</a:t>
-            </a:r>
-          </a:p>
-          <a:p>
-            <a:pPr lvl="2"/>
-            <a:r>
-              <a:rPr lang="de-DE"/>
-              <a:t>Dritte Ebene</a:t>
-            </a:r>
-          </a:p>
-          <a:p>
-            <a:pPr lvl="3"/>
-            <a:r>
-              <a:rPr lang="de-DE"/>
-              <a:t>Vierte Ebene</a:t>
-            </a:r>
-          </a:p>
-          <a:p>
-            <a:pPr lvl="4"/>
-            <a:r>
-              <a:rPr lang="de-DE"/>
-              <a:t>Fünfte Ebene</a:t>
-            </a:r>
-          </a:p>
-        </p:txBody>
-      </p:sp>
-      <p:sp>
-        <p:nvSpPr>
-          <p:cNvPr id="4" name="Datumsplatzhalter 3">
-            <a:extLst>
-              <a:ext uri="{FF2B5EF4-FFF2-40B4-BE49-F238E27FC236}">
-                <a16:creationId xmlns:a16="http://schemas.microsoft.com/office/drawing/2014/main" id="{B894C505-DD7A-4B7A-96D8-CC2B08BED563}"/>
-              </a:ext>
-            </a:extLst>
-          </p:cNvPr>
-          <p:cNvSpPr>
-            <a:spLocks noGrp="1"/>
-          </p:cNvSpPr>
-          <p:nvPr>
-            <p:ph type="dt" sz="half" idx="10"/>
-          </p:nvPr>
-        </p:nvSpPr>
-        <p:spPr/>
-        <p:txBody>
-          <a:bodyPr/>
-          <a:lstStyle/>
-          <a:p>
-            <a:fld id="{54E5E412-067E-4261-A42C-780D4636A693}" type="datetimeFigureOut">
-              <a:rPr lang="de-DE" smtClean="0"/>
-              <a:t>18.01.2018</a:t>
-            </a:fld>
-            <a:endParaRPr lang="de-DE"/>
-          </a:p>
-        </p:txBody>
-      </p:sp>
-      <p:sp>
-        <p:nvSpPr>
-          <p:cNvPr id="5" name="Fußzeilenplatzhalter 4">
-            <a:extLst>
-              <a:ext uri="{FF2B5EF4-FFF2-40B4-BE49-F238E27FC236}">
-                <a16:creationId xmlns:a16="http://schemas.microsoft.com/office/drawing/2014/main" id="{9ABBE2C7-3AEE-438A-9122-BF1E4FBE653A}"/>
-              </a:ext>
-            </a:extLst>
-          </p:cNvPr>
-          <p:cNvSpPr>
-            <a:spLocks noGrp="1"/>
-          </p:cNvSpPr>
-          <p:nvPr>
-            <p:ph type="ftr" sz="quarter" idx="11"/>
-          </p:nvPr>
-        </p:nvSpPr>
-        <p:spPr/>
-        <p:txBody>
-          <a:bodyPr/>
-          <a:lstStyle/>
-          <a:p>
-            <a:endParaRPr lang="de-DE"/>
-          </a:p>
-        </p:txBody>
-      </p:sp>
-      <p:sp>
-        <p:nvSpPr>
-          <p:cNvPr id="6" name="Foliennummernplatzhalter 5">
-            <a:extLst>
-              <a:ext uri="{FF2B5EF4-FFF2-40B4-BE49-F238E27FC236}">
-                <a16:creationId xmlns:a16="http://schemas.microsoft.com/office/drawing/2014/main" id="{89B56E50-7B86-40A4-9169-880ACE2E2FA8}"/>
-              </a:ext>
-            </a:extLst>
-          </p:cNvPr>
-          <p:cNvSpPr>
-            <a:spLocks noGrp="1"/>
-          </p:cNvSpPr>
-          <p:nvPr>
-            <p:ph type="sldNum" sz="quarter" idx="12"/>
-          </p:nvPr>
-        </p:nvSpPr>
-        <p:spPr/>
-        <p:txBody>
-          <a:bodyPr/>
-          <a:lstStyle/>
-          <a:p>
-            <a:fld id="{BFB0D74E-8F52-4ACD-AC95-88CD3CFD8314}" type="slidenum">
-              <a:rPr lang="de-DE" smtClean="0"/>
-              <a:t>‹Nr.›</a:t>
-            </a:fld>
-            <a:endParaRPr lang="de-DE"/>
-          </a:p>
-        </p:txBody>
-      </p:sp>
-    </p:spTree>
-    <p:extLst>
-      <p:ext uri="{BB962C8B-B14F-4D97-AF65-F5344CB8AC3E}">
-        <p14:creationId xmlns:p14="http://schemas.microsoft.com/office/powerpoint/2010/main" val="3340087490"/>
-      </p:ext>
-    </p:extLst>
-  </p:cSld>
-  <p:clrMapOvr>
-    <a:masterClrMapping/>
-  </p:clrMapOvr>
-</p:sldLayout>
-</file>
-
-<file path=ppt/slideLayouts/slideLayout11.xml><?xml version="1.0" encoding="utf-8"?>
 <p:sldLayout xmlns:a="http://schemas.openxmlformats.org/drawingml/2006/main" xmlns:r="http://schemas.openxmlformats.org/officeDocument/2006/relationships" xmlns:p="http://schemas.openxmlformats.org/presentationml/2006/main" type="vertTitleAndTx" preserve="1">
   <p:cSld name="Vertikaler Titel und Text">
     <p:spTree>
@@ -1150,7 +952,7 @@
           <a:p>
             <a:fld id="{54E5E412-067E-4261-A42C-780D4636A693}" type="datetimeFigureOut">
               <a:rPr lang="de-DE" smtClean="0"/>
-              <a:t>18.01.2018</a:t>
+              <a:t>23.01.2018</a:t>
             </a:fld>
             <a:endParaRPr lang="de-DE"/>
           </a:p>
@@ -1474,281 +1276,6 @@
 </file>
 
 <file path=ppt/slideLayouts/slideLayout3.xml><?xml version="1.0" encoding="utf-8"?>
-<p:sldLayout xmlns:a="http://schemas.openxmlformats.org/drawingml/2006/main" xmlns:r="http://schemas.openxmlformats.org/officeDocument/2006/relationships" xmlns:p="http://schemas.openxmlformats.org/presentationml/2006/main" type="secHead" preserve="1">
-  <p:cSld name="Abschnitts-&#10;überschrift">
-    <p:spTree>
-      <p:nvGrpSpPr>
-        <p:cNvPr id="1" name=""/>
-        <p:cNvGrpSpPr/>
-        <p:nvPr/>
-      </p:nvGrpSpPr>
-      <p:grpSpPr>
-        <a:xfrm>
-          <a:off x="0" y="0"/>
-          <a:ext cx="0" cy="0"/>
-          <a:chOff x="0" y="0"/>
-          <a:chExt cx="0" cy="0"/>
-        </a:xfrm>
-      </p:grpSpPr>
-      <p:sp>
-        <p:nvSpPr>
-          <p:cNvPr id="2" name="Titel 1">
-            <a:extLst>
-              <a:ext uri="{FF2B5EF4-FFF2-40B4-BE49-F238E27FC236}">
-                <a16:creationId xmlns:a16="http://schemas.microsoft.com/office/drawing/2014/main" id="{B55B3360-8AC6-4662-AEAD-67032D367B6B}"/>
-              </a:ext>
-            </a:extLst>
-          </p:cNvPr>
-          <p:cNvSpPr>
-            <a:spLocks noGrp="1"/>
-          </p:cNvSpPr>
-          <p:nvPr>
-            <p:ph type="title"/>
-          </p:nvPr>
-        </p:nvSpPr>
-        <p:spPr>
-          <a:xfrm>
-            <a:off x="831850" y="1709738"/>
-            <a:ext cx="10515600" cy="2852737"/>
-          </a:xfrm>
-        </p:spPr>
-        <p:txBody>
-          <a:bodyPr anchor="b"/>
-          <a:lstStyle>
-            <a:lvl1pPr>
-              <a:defRPr sz="6000"/>
-            </a:lvl1pPr>
-          </a:lstStyle>
-          <a:p>
-            <a:r>
-              <a:rPr lang="de-DE"/>
-              <a:t>Mastertitelformat bearbeiten</a:t>
-            </a:r>
-          </a:p>
-        </p:txBody>
-      </p:sp>
-      <p:sp>
-        <p:nvSpPr>
-          <p:cNvPr id="3" name="Textplatzhalter 2">
-            <a:extLst>
-              <a:ext uri="{FF2B5EF4-FFF2-40B4-BE49-F238E27FC236}">
-                <a16:creationId xmlns:a16="http://schemas.microsoft.com/office/drawing/2014/main" id="{C3326717-BCA8-45FA-8D93-128FE615E758}"/>
-              </a:ext>
-            </a:extLst>
-          </p:cNvPr>
-          <p:cNvSpPr>
-            <a:spLocks noGrp="1"/>
-          </p:cNvSpPr>
-          <p:nvPr>
-            <p:ph type="body" idx="1"/>
-          </p:nvPr>
-        </p:nvSpPr>
-        <p:spPr>
-          <a:xfrm>
-            <a:off x="831850" y="4589463"/>
-            <a:ext cx="10515600" cy="1500187"/>
-          </a:xfrm>
-        </p:spPr>
-        <p:txBody>
-          <a:bodyPr/>
-          <a:lstStyle>
-            <a:lvl1pPr marL="0" indent="0">
-              <a:buNone/>
-              <a:defRPr sz="2400">
-                <a:solidFill>
-                  <a:schemeClr val="tx1">
-                    <a:tint val="75000"/>
-                  </a:schemeClr>
-                </a:solidFill>
-              </a:defRPr>
-            </a:lvl1pPr>
-            <a:lvl2pPr marL="457200" indent="0">
-              <a:buNone/>
-              <a:defRPr sz="2000">
-                <a:solidFill>
-                  <a:schemeClr val="tx1">
-                    <a:tint val="75000"/>
-                  </a:schemeClr>
-                </a:solidFill>
-              </a:defRPr>
-            </a:lvl2pPr>
-            <a:lvl3pPr marL="914400" indent="0">
-              <a:buNone/>
-              <a:defRPr sz="1800">
-                <a:solidFill>
-                  <a:schemeClr val="tx1">
-                    <a:tint val="75000"/>
-                  </a:schemeClr>
-                </a:solidFill>
-              </a:defRPr>
-            </a:lvl3pPr>
-            <a:lvl4pPr marL="1371600" indent="0">
-              <a:buNone/>
-              <a:defRPr sz="1600">
-                <a:solidFill>
-                  <a:schemeClr val="tx1">
-                    <a:tint val="75000"/>
-                  </a:schemeClr>
-                </a:solidFill>
-              </a:defRPr>
-            </a:lvl4pPr>
-            <a:lvl5pPr marL="1828800" indent="0">
-              <a:buNone/>
-              <a:defRPr sz="1600">
-                <a:solidFill>
-                  <a:schemeClr val="tx1">
-                    <a:tint val="75000"/>
-                  </a:schemeClr>
-                </a:solidFill>
-              </a:defRPr>
-            </a:lvl5pPr>
-            <a:lvl6pPr marL="2286000" indent="0">
-              <a:buNone/>
-              <a:defRPr sz="1600">
-                <a:solidFill>
-                  <a:schemeClr val="tx1">
-                    <a:tint val="75000"/>
-                  </a:schemeClr>
-                </a:solidFill>
-              </a:defRPr>
-            </a:lvl6pPr>
-            <a:lvl7pPr marL="2743200" indent="0">
-              <a:buNone/>
-              <a:defRPr sz="1600">
-                <a:solidFill>
-                  <a:schemeClr val="tx1">
-                    <a:tint val="75000"/>
-                  </a:schemeClr>
-                </a:solidFill>
-              </a:defRPr>
-            </a:lvl7pPr>
-            <a:lvl8pPr marL="3200400" indent="0">
-              <a:buNone/>
-              <a:defRPr sz="1600">
-                <a:solidFill>
-                  <a:schemeClr val="tx1">
-                    <a:tint val="75000"/>
-                  </a:schemeClr>
-                </a:solidFill>
-              </a:defRPr>
-            </a:lvl8pPr>
-            <a:lvl9pPr marL="3657600" indent="0">
-              <a:buNone/>
-              <a:defRPr sz="1600">
-                <a:solidFill>
-                  <a:schemeClr val="tx1">
-                    <a:tint val="75000"/>
-                  </a:schemeClr>
-                </a:solidFill>
-              </a:defRPr>
-            </a:lvl9pPr>
-          </a:lstStyle>
-          <a:p>
-            <a:pPr lvl="0"/>
-            <a:r>
-              <a:rPr lang="de-DE"/>
-              <a:t>Mastertextformat bearbeiten</a:t>
-            </a:r>
-          </a:p>
-        </p:txBody>
-      </p:sp>
-      <p:sp>
-        <p:nvSpPr>
-          <p:cNvPr id="4" name="Datumsplatzhalter 3">
-            <a:extLst>
-              <a:ext uri="{FF2B5EF4-FFF2-40B4-BE49-F238E27FC236}">
-                <a16:creationId xmlns:a16="http://schemas.microsoft.com/office/drawing/2014/main" id="{CE8EE56F-8C86-4796-9D05-B8E88A940B5D}"/>
-              </a:ext>
-            </a:extLst>
-          </p:cNvPr>
-          <p:cNvSpPr>
-            <a:spLocks noGrp="1"/>
-          </p:cNvSpPr>
-          <p:nvPr>
-            <p:ph type="dt" sz="half" idx="10"/>
-          </p:nvPr>
-        </p:nvSpPr>
-        <p:spPr/>
-        <p:txBody>
-          <a:bodyPr/>
-          <a:lstStyle/>
-          <a:p>
-            <a:fld id="{54E5E412-067E-4261-A42C-780D4636A693}" type="datetimeFigureOut">
-              <a:rPr lang="de-DE" smtClean="0"/>
-              <a:t>18.01.2018</a:t>
-            </a:fld>
-            <a:endParaRPr lang="de-DE"/>
-          </a:p>
-        </p:txBody>
-      </p:sp>
-      <p:sp>
-        <p:nvSpPr>
-          <p:cNvPr id="5" name="Fußzeilenplatzhalter 4">
-            <a:extLst>
-              <a:ext uri="{FF2B5EF4-FFF2-40B4-BE49-F238E27FC236}">
-                <a16:creationId xmlns:a16="http://schemas.microsoft.com/office/drawing/2014/main" id="{6D565F3E-70BE-4644-AF1E-C40DFB254D27}"/>
-              </a:ext>
-            </a:extLst>
-          </p:cNvPr>
-          <p:cNvSpPr>
-            <a:spLocks noGrp="1"/>
-          </p:cNvSpPr>
-          <p:nvPr>
-            <p:ph type="ftr" sz="quarter" idx="11"/>
-          </p:nvPr>
-        </p:nvSpPr>
-        <p:spPr/>
-        <p:txBody>
-          <a:bodyPr/>
-          <a:lstStyle/>
-          <a:p>
-            <a:endParaRPr lang="de-DE"/>
-          </a:p>
-        </p:txBody>
-      </p:sp>
-      <p:sp>
-        <p:nvSpPr>
-          <p:cNvPr id="6" name="Foliennummernplatzhalter 5">
-            <a:extLst>
-              <a:ext uri="{FF2B5EF4-FFF2-40B4-BE49-F238E27FC236}">
-                <a16:creationId xmlns:a16="http://schemas.microsoft.com/office/drawing/2014/main" id="{9324F050-982D-4EF7-BDA0-2A4D14FDF175}"/>
-              </a:ext>
-            </a:extLst>
-          </p:cNvPr>
-          <p:cNvSpPr>
-            <a:spLocks noGrp="1"/>
-          </p:cNvSpPr>
-          <p:nvPr>
-            <p:ph type="sldNum" sz="quarter" idx="12"/>
-          </p:nvPr>
-        </p:nvSpPr>
-        <p:spPr/>
-        <p:txBody>
-          <a:bodyPr/>
-          <a:lstStyle/>
-          <a:p>
-            <a:fld id="{BFB0D74E-8F52-4ACD-AC95-88CD3CFD8314}" type="slidenum">
-              <a:rPr lang="de-DE" smtClean="0"/>
-              <a:t>‹Nr.›</a:t>
-            </a:fld>
-            <a:endParaRPr lang="de-DE"/>
-          </a:p>
-        </p:txBody>
-      </p:sp>
-    </p:spTree>
-    <p:extLst>
-      <p:ext uri="{BB962C8B-B14F-4D97-AF65-F5344CB8AC3E}">
-        <p14:creationId xmlns:p14="http://schemas.microsoft.com/office/powerpoint/2010/main" val="682974371"/>
-      </p:ext>
-    </p:extLst>
-  </p:cSld>
-  <p:clrMapOvr>
-    <a:masterClrMapping/>
-  </p:clrMapOvr>
-</p:sldLayout>
-</file>
-
-<file path=ppt/slideLayouts/slideLayout4.xml><?xml version="1.0" encoding="utf-8"?>
 <p:sldLayout xmlns:a="http://schemas.openxmlformats.org/drawingml/2006/main" xmlns:r="http://schemas.openxmlformats.org/officeDocument/2006/relationships" xmlns:p="http://schemas.openxmlformats.org/presentationml/2006/main" type="twoObj" preserve="1">
   <p:cSld name="Zwei Inhalte">
     <p:spTree>
@@ -1940,7 +1467,7 @@
           <a:p>
             <a:fld id="{54E5E412-067E-4261-A42C-780D4636A693}" type="datetimeFigureOut">
               <a:rPr lang="de-DE" smtClean="0"/>
-              <a:t>18.01.2018</a:t>
+              <a:t>23.01.2018</a:t>
             </a:fld>
             <a:endParaRPr lang="de-DE"/>
           </a:p>
@@ -2013,7 +1540,7 @@
 </p:sldLayout>
 </file>
 
-<file path=ppt/slideLayouts/slideLayout5.xml><?xml version="1.0" encoding="utf-8"?>
+<file path=ppt/slideLayouts/slideLayout4.xml><?xml version="1.0" encoding="utf-8"?>
 <p:sldLayout xmlns:a="http://schemas.openxmlformats.org/drawingml/2006/main" xmlns:r="http://schemas.openxmlformats.org/officeDocument/2006/relationships" xmlns:p="http://schemas.openxmlformats.org/presentationml/2006/main" type="twoTxTwoObj" preserve="1">
   <p:cSld name="Vergleich">
     <p:spTree>
@@ -2352,7 +1879,7 @@
           <a:p>
             <a:fld id="{54E5E412-067E-4261-A42C-780D4636A693}" type="datetimeFigureOut">
               <a:rPr lang="de-DE" smtClean="0"/>
-              <a:t>18.01.2018</a:t>
+              <a:t>23.01.2018</a:t>
             </a:fld>
             <a:endParaRPr lang="de-DE"/>
           </a:p>
@@ -2425,7 +1952,7 @@
 </p:sldLayout>
 </file>
 
-<file path=ppt/slideLayouts/slideLayout6.xml><?xml version="1.0" encoding="utf-8"?>
+<file path=ppt/slideLayouts/slideLayout5.xml><?xml version="1.0" encoding="utf-8"?>
 <p:sldLayout xmlns:a="http://schemas.openxmlformats.org/drawingml/2006/main" xmlns:r="http://schemas.openxmlformats.org/officeDocument/2006/relationships" xmlns:p="http://schemas.openxmlformats.org/presentationml/2006/main" type="titleOnly" preserve="1">
   <p:cSld name="Nur Titel">
     <p:spTree>
@@ -2493,7 +2020,7 @@
           <a:p>
             <a:fld id="{54E5E412-067E-4261-A42C-780D4636A693}" type="datetimeFigureOut">
               <a:rPr lang="de-DE" smtClean="0"/>
-              <a:t>18.01.2018</a:t>
+              <a:t>23.01.2018</a:t>
             </a:fld>
             <a:endParaRPr lang="de-DE"/>
           </a:p>
@@ -2566,7 +2093,7 @@
 </p:sldLayout>
 </file>
 
-<file path=ppt/slideLayouts/slideLayout7.xml><?xml version="1.0" encoding="utf-8"?>
+<file path=ppt/slideLayouts/slideLayout6.xml><?xml version="1.0" encoding="utf-8"?>
 <p:sldLayout xmlns:a="http://schemas.openxmlformats.org/drawingml/2006/main" xmlns:r="http://schemas.openxmlformats.org/officeDocument/2006/relationships" xmlns:p="http://schemas.openxmlformats.org/presentationml/2006/main" type="blank" preserve="1">
   <p:cSld name="Leer">
     <p:spTree>
@@ -2606,7 +2133,7 @@
           <a:p>
             <a:fld id="{54E5E412-067E-4261-A42C-780D4636A693}" type="datetimeFigureOut">
               <a:rPr lang="de-DE" smtClean="0"/>
-              <a:t>18.01.2018</a:t>
+              <a:t>23.01.2018</a:t>
             </a:fld>
             <a:endParaRPr lang="de-DE"/>
           </a:p>
@@ -2679,7 +2206,7 @@
 </p:sldLayout>
 </file>
 
-<file path=ppt/slideLayouts/slideLayout8.xml><?xml version="1.0" encoding="utf-8"?>
+<file path=ppt/slideLayouts/slideLayout7.xml><?xml version="1.0" encoding="utf-8"?>
 <p:sldLayout xmlns:a="http://schemas.openxmlformats.org/drawingml/2006/main" xmlns:r="http://schemas.openxmlformats.org/officeDocument/2006/relationships" xmlns:p="http://schemas.openxmlformats.org/presentationml/2006/main" type="objTx" preserve="1">
   <p:cSld name="Inhalt mit Überschrift">
     <p:spTree>
@@ -2917,7 +2444,7 @@
           <a:p>
             <a:fld id="{54E5E412-067E-4261-A42C-780D4636A693}" type="datetimeFigureOut">
               <a:rPr lang="de-DE" smtClean="0"/>
-              <a:t>18.01.2018</a:t>
+              <a:t>23.01.2018</a:t>
             </a:fld>
             <a:endParaRPr lang="de-DE"/>
           </a:p>
@@ -2990,7 +2517,7 @@
 </p:sldLayout>
 </file>
 
-<file path=ppt/slideLayouts/slideLayout9.xml><?xml version="1.0" encoding="utf-8"?>
+<file path=ppt/slideLayouts/slideLayout8.xml><?xml version="1.0" encoding="utf-8"?>
 <p:sldLayout xmlns:a="http://schemas.openxmlformats.org/drawingml/2006/main" xmlns:r="http://schemas.openxmlformats.org/officeDocument/2006/relationships" xmlns:p="http://schemas.openxmlformats.org/presentationml/2006/main" type="picTx" preserve="1">
   <p:cSld name="Bild mit Überschrift">
     <p:spTree>
@@ -3205,7 +2732,7 @@
           <a:p>
             <a:fld id="{54E5E412-067E-4261-A42C-780D4636A693}" type="datetimeFigureOut">
               <a:rPr lang="de-DE" smtClean="0"/>
-              <a:t>18.01.2018</a:t>
+              <a:t>23.01.2018</a:t>
             </a:fld>
             <a:endParaRPr lang="de-DE"/>
           </a:p>
@@ -3269,6 +2796,204 @@
     <p:extLst>
       <p:ext uri="{BB962C8B-B14F-4D97-AF65-F5344CB8AC3E}">
         <p14:creationId xmlns:p14="http://schemas.microsoft.com/office/powerpoint/2010/main" val="1081407298"/>
+      </p:ext>
+    </p:extLst>
+  </p:cSld>
+  <p:clrMapOvr>
+    <a:masterClrMapping/>
+  </p:clrMapOvr>
+</p:sldLayout>
+</file>
+
+<file path=ppt/slideLayouts/slideLayout9.xml><?xml version="1.0" encoding="utf-8"?>
+<p:sldLayout xmlns:a="http://schemas.openxmlformats.org/drawingml/2006/main" xmlns:r="http://schemas.openxmlformats.org/officeDocument/2006/relationships" xmlns:p="http://schemas.openxmlformats.org/presentationml/2006/main" type="vertTx" preserve="1">
+  <p:cSld name="Titel und vertikaler Text">
+    <p:spTree>
+      <p:nvGrpSpPr>
+        <p:cNvPr id="1" name=""/>
+        <p:cNvGrpSpPr/>
+        <p:nvPr/>
+      </p:nvGrpSpPr>
+      <p:grpSpPr>
+        <a:xfrm>
+          <a:off x="0" y="0"/>
+          <a:ext cx="0" cy="0"/>
+          <a:chOff x="0" y="0"/>
+          <a:chExt cx="0" cy="0"/>
+        </a:xfrm>
+      </p:grpSpPr>
+      <p:sp>
+        <p:nvSpPr>
+          <p:cNvPr id="2" name="Titel 1">
+            <a:extLst>
+              <a:ext uri="{FF2B5EF4-FFF2-40B4-BE49-F238E27FC236}">
+                <a16:creationId xmlns:a16="http://schemas.microsoft.com/office/drawing/2014/main" id="{B9821B27-80D6-4175-AAEA-700C5057615E}"/>
+              </a:ext>
+            </a:extLst>
+          </p:cNvPr>
+          <p:cNvSpPr>
+            <a:spLocks noGrp="1"/>
+          </p:cNvSpPr>
+          <p:nvPr>
+            <p:ph type="title"/>
+          </p:nvPr>
+        </p:nvSpPr>
+        <p:spPr/>
+        <p:txBody>
+          <a:bodyPr/>
+          <a:lstStyle/>
+          <a:p>
+            <a:r>
+              <a:rPr lang="de-DE"/>
+              <a:t>Mastertitelformat bearbeiten</a:t>
+            </a:r>
+          </a:p>
+        </p:txBody>
+      </p:sp>
+      <p:sp>
+        <p:nvSpPr>
+          <p:cNvPr id="3" name="Vertikaler Textplatzhalter 2">
+            <a:extLst>
+              <a:ext uri="{FF2B5EF4-FFF2-40B4-BE49-F238E27FC236}">
+                <a16:creationId xmlns:a16="http://schemas.microsoft.com/office/drawing/2014/main" id="{BF68F219-96C8-4BBE-8B2C-4E16B3C69B85}"/>
+              </a:ext>
+            </a:extLst>
+          </p:cNvPr>
+          <p:cNvSpPr>
+            <a:spLocks noGrp="1"/>
+          </p:cNvSpPr>
+          <p:nvPr>
+            <p:ph type="body" orient="vert" idx="1"/>
+          </p:nvPr>
+        </p:nvSpPr>
+        <p:spPr/>
+        <p:txBody>
+          <a:bodyPr vert="eaVert"/>
+          <a:lstStyle/>
+          <a:p>
+            <a:pPr lvl="0"/>
+            <a:r>
+              <a:rPr lang="de-DE"/>
+              <a:t>Mastertextformat bearbeiten</a:t>
+            </a:r>
+          </a:p>
+          <a:p>
+            <a:pPr lvl="1"/>
+            <a:r>
+              <a:rPr lang="de-DE"/>
+              <a:t>Zweite Ebene</a:t>
+            </a:r>
+          </a:p>
+          <a:p>
+            <a:pPr lvl="2"/>
+            <a:r>
+              <a:rPr lang="de-DE"/>
+              <a:t>Dritte Ebene</a:t>
+            </a:r>
+          </a:p>
+          <a:p>
+            <a:pPr lvl="3"/>
+            <a:r>
+              <a:rPr lang="de-DE"/>
+              <a:t>Vierte Ebene</a:t>
+            </a:r>
+          </a:p>
+          <a:p>
+            <a:pPr lvl="4"/>
+            <a:r>
+              <a:rPr lang="de-DE"/>
+              <a:t>Fünfte Ebene</a:t>
+            </a:r>
+          </a:p>
+        </p:txBody>
+      </p:sp>
+      <p:sp>
+        <p:nvSpPr>
+          <p:cNvPr id="4" name="Datumsplatzhalter 3">
+            <a:extLst>
+              <a:ext uri="{FF2B5EF4-FFF2-40B4-BE49-F238E27FC236}">
+                <a16:creationId xmlns:a16="http://schemas.microsoft.com/office/drawing/2014/main" id="{B894C505-DD7A-4B7A-96D8-CC2B08BED563}"/>
+              </a:ext>
+            </a:extLst>
+          </p:cNvPr>
+          <p:cNvSpPr>
+            <a:spLocks noGrp="1"/>
+          </p:cNvSpPr>
+          <p:nvPr>
+            <p:ph type="dt" sz="half" idx="10"/>
+          </p:nvPr>
+        </p:nvSpPr>
+        <p:spPr/>
+        <p:txBody>
+          <a:bodyPr/>
+          <a:lstStyle/>
+          <a:p>
+            <a:fld id="{54E5E412-067E-4261-A42C-780D4636A693}" type="datetimeFigureOut">
+              <a:rPr lang="de-DE" smtClean="0"/>
+              <a:t>23.01.2018</a:t>
+            </a:fld>
+            <a:endParaRPr lang="de-DE"/>
+          </a:p>
+        </p:txBody>
+      </p:sp>
+      <p:sp>
+        <p:nvSpPr>
+          <p:cNvPr id="5" name="Fußzeilenplatzhalter 4">
+            <a:extLst>
+              <a:ext uri="{FF2B5EF4-FFF2-40B4-BE49-F238E27FC236}">
+                <a16:creationId xmlns:a16="http://schemas.microsoft.com/office/drawing/2014/main" id="{9ABBE2C7-3AEE-438A-9122-BF1E4FBE653A}"/>
+              </a:ext>
+            </a:extLst>
+          </p:cNvPr>
+          <p:cNvSpPr>
+            <a:spLocks noGrp="1"/>
+          </p:cNvSpPr>
+          <p:nvPr>
+            <p:ph type="ftr" sz="quarter" idx="11"/>
+          </p:nvPr>
+        </p:nvSpPr>
+        <p:spPr/>
+        <p:txBody>
+          <a:bodyPr/>
+          <a:lstStyle/>
+          <a:p>
+            <a:endParaRPr lang="de-DE"/>
+          </a:p>
+        </p:txBody>
+      </p:sp>
+      <p:sp>
+        <p:nvSpPr>
+          <p:cNvPr id="6" name="Foliennummernplatzhalter 5">
+            <a:extLst>
+              <a:ext uri="{FF2B5EF4-FFF2-40B4-BE49-F238E27FC236}">
+                <a16:creationId xmlns:a16="http://schemas.microsoft.com/office/drawing/2014/main" id="{89B56E50-7B86-40A4-9169-880ACE2E2FA8}"/>
+              </a:ext>
+            </a:extLst>
+          </p:cNvPr>
+          <p:cNvSpPr>
+            <a:spLocks noGrp="1"/>
+          </p:cNvSpPr>
+          <p:nvPr>
+            <p:ph type="sldNum" sz="quarter" idx="12"/>
+          </p:nvPr>
+        </p:nvSpPr>
+        <p:spPr/>
+        <p:txBody>
+          <a:bodyPr/>
+          <a:lstStyle/>
+          <a:p>
+            <a:fld id="{BFB0D74E-8F52-4ACD-AC95-88CD3CFD8314}" type="slidenum">
+              <a:rPr lang="de-DE" smtClean="0"/>
+              <a:t>‹Nr.›</a:t>
+            </a:fld>
+            <a:endParaRPr lang="de-DE"/>
+          </a:p>
+        </p:txBody>
+      </p:sp>
+    </p:spTree>
+    <p:extLst>
+      <p:ext uri="{BB962C8B-B14F-4D97-AF65-F5344CB8AC3E}">
+        <p14:creationId xmlns:p14="http://schemas.microsoft.com/office/powerpoint/2010/main" val="3340087490"/>
       </p:ext>
     </p:extLst>
   </p:cSld>
@@ -3446,7 +3171,7 @@
           <a:p>
             <a:fld id="{54E5E412-067E-4261-A42C-780D4636A693}" type="datetimeFigureOut">
               <a:rPr lang="de-DE" smtClean="0"/>
-              <a:t>18.01.2018</a:t>
+              <a:t>23.01.2018</a:t>
             </a:fld>
             <a:endParaRPr lang="de-DE"/>
           </a:p>
@@ -3553,15 +3278,14 @@
   <p:sldLayoutIdLst>
     <p:sldLayoutId id="2147483649" r:id="rId1"/>
     <p:sldLayoutId id="2147483650" r:id="rId2"/>
-    <p:sldLayoutId id="2147483651" r:id="rId3"/>
-    <p:sldLayoutId id="2147483652" r:id="rId4"/>
-    <p:sldLayoutId id="2147483653" r:id="rId5"/>
-    <p:sldLayoutId id="2147483654" r:id="rId6"/>
-    <p:sldLayoutId id="2147483655" r:id="rId7"/>
-    <p:sldLayoutId id="2147483656" r:id="rId8"/>
-    <p:sldLayoutId id="2147483657" r:id="rId9"/>
-    <p:sldLayoutId id="2147483658" r:id="rId10"/>
-    <p:sldLayoutId id="2147483659" r:id="rId11"/>
+    <p:sldLayoutId id="2147483652" r:id="rId3"/>
+    <p:sldLayoutId id="2147483653" r:id="rId4"/>
+    <p:sldLayoutId id="2147483654" r:id="rId5"/>
+    <p:sldLayoutId id="2147483655" r:id="rId6"/>
+    <p:sldLayoutId id="2147483656" r:id="rId7"/>
+    <p:sldLayoutId id="2147483657" r:id="rId8"/>
+    <p:sldLayoutId id="2147483658" r:id="rId9"/>
+    <p:sldLayoutId id="2147483659" r:id="rId10"/>
   </p:sldLayoutIdLst>
   <p:txStyles>
     <p:titleStyle>
@@ -6239,7 +5963,7 @@
                   <a:schemeClr val="bg1"/>
                 </a:solidFill>
               </a:rPr>
-              <a:t>5. Code-Teile </a:t>
+              <a:t>5. Ausgewählte Code-Teile </a:t>
             </a:r>
           </a:p>
         </p:txBody>
@@ -6656,7 +6380,7 @@
         </p:nvSpPr>
         <p:spPr>
           <a:xfrm>
-            <a:off x="838200" y="1355842"/>
+            <a:off x="838200" y="1365173"/>
             <a:ext cx="10515600" cy="1815198"/>
           </a:xfrm>
         </p:spPr>
@@ -6796,7 +6520,7 @@
         </p:blipFill>
         <p:spPr>
           <a:xfrm>
-            <a:off x="5085282" y="3568760"/>
+            <a:off x="5085282" y="3578091"/>
             <a:ext cx="2021435" cy="1516076"/>
           </a:xfrm>
           <a:prstGeom prst="rect">
@@ -6836,6 +6560,9 @@
                     <p:cTn id="3" fill="hold">
                       <p:stCondLst>
                         <p:cond delay="indefinite"/>
+                        <p:cond evt="onBegin" delay="0">
+                          <p:tn val="2"/>
+                        </p:cond>
                       </p:stCondLst>
                       <p:childTnLst>
                         <p:par>
@@ -6845,7 +6572,7 @@
                             </p:stCondLst>
                             <p:childTnLst>
                               <p:par>
-                                <p:cTn id="5" presetID="42" presetClass="entr" presetSubtype="0" fill="hold" grpId="0" nodeType="clickEffect">
+                                <p:cTn id="5" presetID="42" presetClass="entr" presetSubtype="0" fill="hold" grpId="0" nodeType="withEffect">
                                   <p:stCondLst>
                                     <p:cond delay="0"/>
                                   </p:stCondLst>

</xml_diff>